<commit_message>
Added Course Materials - Day 4
</commit_message>
<xml_diff>
--- a/2. Core Java/Day 3/Slides/4. Variables, Data Types, and Math Operators/variables-data-types-and-math-operators-slides.pptx
+++ b/2. Core Java/Day 3/Slides/4. Variables, Data Types, and Math Operators/variables-data-types-and-math-operators-slides.pptx
@@ -3314,54 +3314,6 @@
           </a:prstGeom>
         </p:spPr>
       </p:pic>
-      <p:sp>
-        <p:nvSpPr>
-          <p:cNvPr id="32" name="object 32"/>
-          <p:cNvSpPr/>
-          <p:nvPr/>
-        </p:nvSpPr>
-        <p:spPr>
-          <a:xfrm>
-            <a:off x="426719" y="6060947"/>
-            <a:ext cx="11026140" cy="485140"/>
-          </a:xfrm>
-          <a:custGeom>
-            <a:avLst/>
-            <a:gdLst/>
-            <a:ahLst/>
-            <a:cxnLst/>
-            <a:rect l="l" t="t" r="r" b="b"/>
-            <a:pathLst>
-              <a:path w="11026140" h="485140">
-                <a:moveTo>
-                  <a:pt x="11026140" y="0"/>
-                </a:moveTo>
-                <a:lnTo>
-                  <a:pt x="0" y="0"/>
-                </a:lnTo>
-                <a:lnTo>
-                  <a:pt x="0" y="484631"/>
-                </a:lnTo>
-                <a:lnTo>
-                  <a:pt x="11026140" y="484631"/>
-                </a:lnTo>
-                <a:lnTo>
-                  <a:pt x="11026140" y="0"/>
-                </a:lnTo>
-                <a:close/>
-              </a:path>
-            </a:pathLst>
-          </a:custGeom>
-          <a:solidFill>
-            <a:srgbClr val="FFFFFF"/>
-          </a:solidFill>
-        </p:spPr>
-        <p:txBody>
-          <a:bodyPr wrap="square" lIns="0" tIns="0" rIns="0" bIns="0" rtlCol="0"/>
-          <a:lstStyle/>
-          <a:p/>
-        </p:txBody>
-      </p:sp>
       <p:sp>
         <p:nvSpPr>
           <p:cNvPr id="33" name="Slide Number Placeholder 32"/>
@@ -8333,966 +8285,6 @@
       </p:grpSp>
       <p:sp>
         <p:nvSpPr>
-          <p:cNvPr id="57" name="object 57"/>
-          <p:cNvSpPr/>
-          <p:nvPr/>
-        </p:nvSpPr>
-        <p:spPr>
-          <a:xfrm>
-            <a:off x="4485132" y="2840735"/>
-            <a:ext cx="1259205" cy="281940"/>
-          </a:xfrm>
-          <a:custGeom>
-            <a:avLst/>
-            <a:gdLst/>
-            <a:ahLst/>
-            <a:cxnLst/>
-            <a:rect l="l" t="t" r="r" b="b"/>
-            <a:pathLst>
-              <a:path w="1259204" h="281939">
-                <a:moveTo>
-                  <a:pt x="1258824" y="0"/>
-                </a:moveTo>
-                <a:lnTo>
-                  <a:pt x="0" y="0"/>
-                </a:lnTo>
-                <a:lnTo>
-                  <a:pt x="0" y="281939"/>
-                </a:lnTo>
-                <a:lnTo>
-                  <a:pt x="1258824" y="281939"/>
-                </a:lnTo>
-                <a:lnTo>
-                  <a:pt x="1258824" y="0"/>
-                </a:lnTo>
-                <a:close/>
-              </a:path>
-            </a:pathLst>
-          </a:custGeom>
-          <a:solidFill>
-            <a:srgbClr val="F8D1CD"/>
-          </a:solidFill>
-        </p:spPr>
-        <p:txBody>
-          <a:bodyPr wrap="square" lIns="0" tIns="0" rIns="0" bIns="0" rtlCol="0"/>
-          <a:lstStyle/>
-          <a:p/>
-        </p:txBody>
-      </p:sp>
-      <p:sp>
-        <p:nvSpPr>
-          <p:cNvPr id="58" name="object 58"/>
-          <p:cNvSpPr/>
-          <p:nvPr/>
-        </p:nvSpPr>
-        <p:spPr>
-          <a:xfrm>
-            <a:off x="6182867" y="2840735"/>
-            <a:ext cx="1259205" cy="281940"/>
-          </a:xfrm>
-          <a:custGeom>
-            <a:avLst/>
-            <a:gdLst/>
-            <a:ahLst/>
-            <a:cxnLst/>
-            <a:rect l="l" t="t" r="r" b="b"/>
-            <a:pathLst>
-              <a:path w="1259204" h="281939">
-                <a:moveTo>
-                  <a:pt x="1258824" y="0"/>
-                </a:moveTo>
-                <a:lnTo>
-                  <a:pt x="0" y="0"/>
-                </a:lnTo>
-                <a:lnTo>
-                  <a:pt x="0" y="281939"/>
-                </a:lnTo>
-                <a:lnTo>
-                  <a:pt x="1258824" y="281939"/>
-                </a:lnTo>
-                <a:lnTo>
-                  <a:pt x="1258824" y="0"/>
-                </a:lnTo>
-                <a:close/>
-              </a:path>
-            </a:pathLst>
-          </a:custGeom>
-          <a:solidFill>
-            <a:srgbClr val="F8D1CD"/>
-          </a:solidFill>
-        </p:spPr>
-        <p:txBody>
-          <a:bodyPr wrap="square" lIns="0" tIns="0" rIns="0" bIns="0" rtlCol="0"/>
-          <a:lstStyle/>
-          <a:p/>
-        </p:txBody>
-      </p:sp>
-      <p:sp>
-        <p:nvSpPr>
-          <p:cNvPr id="59" name="object 59"/>
-          <p:cNvSpPr/>
-          <p:nvPr/>
-        </p:nvSpPr>
-        <p:spPr>
-          <a:xfrm>
-            <a:off x="7760207" y="2840735"/>
-            <a:ext cx="1259205" cy="281940"/>
-          </a:xfrm>
-          <a:custGeom>
-            <a:avLst/>
-            <a:gdLst/>
-            <a:ahLst/>
-            <a:cxnLst/>
-            <a:rect l="l" t="t" r="r" b="b"/>
-            <a:pathLst>
-              <a:path w="1259204" h="281939">
-                <a:moveTo>
-                  <a:pt x="1258824" y="0"/>
-                </a:moveTo>
-                <a:lnTo>
-                  <a:pt x="0" y="0"/>
-                </a:lnTo>
-                <a:lnTo>
-                  <a:pt x="0" y="281939"/>
-                </a:lnTo>
-                <a:lnTo>
-                  <a:pt x="1258824" y="281939"/>
-                </a:lnTo>
-                <a:lnTo>
-                  <a:pt x="1258824" y="0"/>
-                </a:lnTo>
-                <a:close/>
-              </a:path>
-            </a:pathLst>
-          </a:custGeom>
-          <a:solidFill>
-            <a:srgbClr val="F8D1CD"/>
-          </a:solidFill>
-        </p:spPr>
-        <p:txBody>
-          <a:bodyPr wrap="square" lIns="0" tIns="0" rIns="0" bIns="0" rtlCol="0"/>
-          <a:lstStyle/>
-          <a:p/>
-        </p:txBody>
-      </p:sp>
-      <p:sp>
-        <p:nvSpPr>
-          <p:cNvPr id="60" name="object 60"/>
-          <p:cNvSpPr/>
-          <p:nvPr/>
-        </p:nvSpPr>
-        <p:spPr>
-          <a:xfrm>
-            <a:off x="9459468" y="2840735"/>
-            <a:ext cx="1259205" cy="281940"/>
-          </a:xfrm>
-          <a:custGeom>
-            <a:avLst/>
-            <a:gdLst/>
-            <a:ahLst/>
-            <a:cxnLst/>
-            <a:rect l="l" t="t" r="r" b="b"/>
-            <a:pathLst>
-              <a:path w="1259204" h="281939">
-                <a:moveTo>
-                  <a:pt x="1258824" y="0"/>
-                </a:moveTo>
-                <a:lnTo>
-                  <a:pt x="0" y="0"/>
-                </a:lnTo>
-                <a:lnTo>
-                  <a:pt x="0" y="281939"/>
-                </a:lnTo>
-                <a:lnTo>
-                  <a:pt x="1258824" y="281939"/>
-                </a:lnTo>
-                <a:lnTo>
-                  <a:pt x="1258824" y="0"/>
-                </a:lnTo>
-                <a:close/>
-              </a:path>
-            </a:pathLst>
-          </a:custGeom>
-          <a:solidFill>
-            <a:srgbClr val="F8D1CD"/>
-          </a:solidFill>
-        </p:spPr>
-        <p:txBody>
-          <a:bodyPr wrap="square" lIns="0" tIns="0" rIns="0" bIns="0" rtlCol="0"/>
-          <a:lstStyle/>
-          <a:p/>
-        </p:txBody>
-      </p:sp>
-      <p:sp>
-        <p:nvSpPr>
-          <p:cNvPr id="61" name="object 61"/>
-          <p:cNvSpPr/>
-          <p:nvPr/>
-        </p:nvSpPr>
-        <p:spPr>
-          <a:xfrm>
-            <a:off x="4485132" y="3224783"/>
-            <a:ext cx="1259205" cy="283845"/>
-          </a:xfrm>
-          <a:custGeom>
-            <a:avLst/>
-            <a:gdLst/>
-            <a:ahLst/>
-            <a:cxnLst/>
-            <a:rect l="l" t="t" r="r" b="b"/>
-            <a:pathLst>
-              <a:path w="1259204" h="283845">
-                <a:moveTo>
-                  <a:pt x="1258824" y="0"/>
-                </a:moveTo>
-                <a:lnTo>
-                  <a:pt x="0" y="0"/>
-                </a:lnTo>
-                <a:lnTo>
-                  <a:pt x="0" y="283463"/>
-                </a:lnTo>
-                <a:lnTo>
-                  <a:pt x="1258824" y="283463"/>
-                </a:lnTo>
-                <a:lnTo>
-                  <a:pt x="1258824" y="0"/>
-                </a:lnTo>
-                <a:close/>
-              </a:path>
-            </a:pathLst>
-          </a:custGeom>
-          <a:solidFill>
-            <a:srgbClr val="FBEAE8"/>
-          </a:solidFill>
-        </p:spPr>
-        <p:txBody>
-          <a:bodyPr wrap="square" lIns="0" tIns="0" rIns="0" bIns="0" rtlCol="0"/>
-          <a:lstStyle/>
-          <a:p/>
-        </p:txBody>
-      </p:sp>
-      <p:sp>
-        <p:nvSpPr>
-          <p:cNvPr id="62" name="object 62"/>
-          <p:cNvSpPr/>
-          <p:nvPr/>
-        </p:nvSpPr>
-        <p:spPr>
-          <a:xfrm>
-            <a:off x="6182867" y="3224783"/>
-            <a:ext cx="1259205" cy="283845"/>
-          </a:xfrm>
-          <a:custGeom>
-            <a:avLst/>
-            <a:gdLst/>
-            <a:ahLst/>
-            <a:cxnLst/>
-            <a:rect l="l" t="t" r="r" b="b"/>
-            <a:pathLst>
-              <a:path w="1259204" h="283845">
-                <a:moveTo>
-                  <a:pt x="1258824" y="0"/>
-                </a:moveTo>
-                <a:lnTo>
-                  <a:pt x="0" y="0"/>
-                </a:lnTo>
-                <a:lnTo>
-                  <a:pt x="0" y="283463"/>
-                </a:lnTo>
-                <a:lnTo>
-                  <a:pt x="1258824" y="283463"/>
-                </a:lnTo>
-                <a:lnTo>
-                  <a:pt x="1258824" y="0"/>
-                </a:lnTo>
-                <a:close/>
-              </a:path>
-            </a:pathLst>
-          </a:custGeom>
-          <a:solidFill>
-            <a:srgbClr val="FBEAE8"/>
-          </a:solidFill>
-        </p:spPr>
-        <p:txBody>
-          <a:bodyPr wrap="square" lIns="0" tIns="0" rIns="0" bIns="0" rtlCol="0"/>
-          <a:lstStyle/>
-          <a:p/>
-        </p:txBody>
-      </p:sp>
-      <p:sp>
-        <p:nvSpPr>
-          <p:cNvPr id="63" name="object 63"/>
-          <p:cNvSpPr/>
-          <p:nvPr/>
-        </p:nvSpPr>
-        <p:spPr>
-          <a:xfrm>
-            <a:off x="7760207" y="3224783"/>
-            <a:ext cx="1259205" cy="283845"/>
-          </a:xfrm>
-          <a:custGeom>
-            <a:avLst/>
-            <a:gdLst/>
-            <a:ahLst/>
-            <a:cxnLst/>
-            <a:rect l="l" t="t" r="r" b="b"/>
-            <a:pathLst>
-              <a:path w="1259204" h="283845">
-                <a:moveTo>
-                  <a:pt x="1258824" y="0"/>
-                </a:moveTo>
-                <a:lnTo>
-                  <a:pt x="0" y="0"/>
-                </a:lnTo>
-                <a:lnTo>
-                  <a:pt x="0" y="283463"/>
-                </a:lnTo>
-                <a:lnTo>
-                  <a:pt x="1258824" y="283463"/>
-                </a:lnTo>
-                <a:lnTo>
-                  <a:pt x="1258824" y="0"/>
-                </a:lnTo>
-                <a:close/>
-              </a:path>
-            </a:pathLst>
-          </a:custGeom>
-          <a:solidFill>
-            <a:srgbClr val="FBEAE8"/>
-          </a:solidFill>
-        </p:spPr>
-        <p:txBody>
-          <a:bodyPr wrap="square" lIns="0" tIns="0" rIns="0" bIns="0" rtlCol="0"/>
-          <a:lstStyle/>
-          <a:p/>
-        </p:txBody>
-      </p:sp>
-      <p:sp>
-        <p:nvSpPr>
-          <p:cNvPr id="64" name="object 64"/>
-          <p:cNvSpPr/>
-          <p:nvPr/>
-        </p:nvSpPr>
-        <p:spPr>
-          <a:xfrm>
-            <a:off x="9459468" y="3224783"/>
-            <a:ext cx="1259205" cy="283845"/>
-          </a:xfrm>
-          <a:custGeom>
-            <a:avLst/>
-            <a:gdLst/>
-            <a:ahLst/>
-            <a:cxnLst/>
-            <a:rect l="l" t="t" r="r" b="b"/>
-            <a:pathLst>
-              <a:path w="1259204" h="283845">
-                <a:moveTo>
-                  <a:pt x="1258824" y="0"/>
-                </a:moveTo>
-                <a:lnTo>
-                  <a:pt x="0" y="0"/>
-                </a:lnTo>
-                <a:lnTo>
-                  <a:pt x="0" y="283463"/>
-                </a:lnTo>
-                <a:lnTo>
-                  <a:pt x="1258824" y="283463"/>
-                </a:lnTo>
-                <a:lnTo>
-                  <a:pt x="1258824" y="0"/>
-                </a:lnTo>
-                <a:close/>
-              </a:path>
-            </a:pathLst>
-          </a:custGeom>
-          <a:solidFill>
-            <a:srgbClr val="FBEAE8"/>
-          </a:solidFill>
-        </p:spPr>
-        <p:txBody>
-          <a:bodyPr wrap="square" lIns="0" tIns="0" rIns="0" bIns="0" rtlCol="0"/>
-          <a:lstStyle/>
-          <a:p/>
-        </p:txBody>
-      </p:sp>
-      <p:sp>
-        <p:nvSpPr>
-          <p:cNvPr id="65" name="object 65"/>
-          <p:cNvSpPr/>
-          <p:nvPr/>
-        </p:nvSpPr>
-        <p:spPr>
-          <a:xfrm>
-            <a:off x="4485132" y="3610355"/>
-            <a:ext cx="1259205" cy="281940"/>
-          </a:xfrm>
-          <a:custGeom>
-            <a:avLst/>
-            <a:gdLst/>
-            <a:ahLst/>
-            <a:cxnLst/>
-            <a:rect l="l" t="t" r="r" b="b"/>
-            <a:pathLst>
-              <a:path w="1259204" h="281939">
-                <a:moveTo>
-                  <a:pt x="1258824" y="0"/>
-                </a:moveTo>
-                <a:lnTo>
-                  <a:pt x="0" y="0"/>
-                </a:lnTo>
-                <a:lnTo>
-                  <a:pt x="0" y="281940"/>
-                </a:lnTo>
-                <a:lnTo>
-                  <a:pt x="1258824" y="281940"/>
-                </a:lnTo>
-                <a:lnTo>
-                  <a:pt x="1258824" y="0"/>
-                </a:lnTo>
-                <a:close/>
-              </a:path>
-            </a:pathLst>
-          </a:custGeom>
-          <a:solidFill>
-            <a:srgbClr val="F8D1CD"/>
-          </a:solidFill>
-        </p:spPr>
-        <p:txBody>
-          <a:bodyPr wrap="square" lIns="0" tIns="0" rIns="0" bIns="0" rtlCol="0"/>
-          <a:lstStyle/>
-          <a:p/>
-        </p:txBody>
-      </p:sp>
-      <p:sp>
-        <p:nvSpPr>
-          <p:cNvPr id="66" name="object 66"/>
-          <p:cNvSpPr/>
-          <p:nvPr/>
-        </p:nvSpPr>
-        <p:spPr>
-          <a:xfrm>
-            <a:off x="6182867" y="3610355"/>
-            <a:ext cx="1259205" cy="281940"/>
-          </a:xfrm>
-          <a:custGeom>
-            <a:avLst/>
-            <a:gdLst/>
-            <a:ahLst/>
-            <a:cxnLst/>
-            <a:rect l="l" t="t" r="r" b="b"/>
-            <a:pathLst>
-              <a:path w="1259204" h="281939">
-                <a:moveTo>
-                  <a:pt x="1258824" y="0"/>
-                </a:moveTo>
-                <a:lnTo>
-                  <a:pt x="0" y="0"/>
-                </a:lnTo>
-                <a:lnTo>
-                  <a:pt x="0" y="281940"/>
-                </a:lnTo>
-                <a:lnTo>
-                  <a:pt x="1258824" y="281940"/>
-                </a:lnTo>
-                <a:lnTo>
-                  <a:pt x="1258824" y="0"/>
-                </a:lnTo>
-                <a:close/>
-              </a:path>
-            </a:pathLst>
-          </a:custGeom>
-          <a:solidFill>
-            <a:srgbClr val="F8D1CD"/>
-          </a:solidFill>
-        </p:spPr>
-        <p:txBody>
-          <a:bodyPr wrap="square" lIns="0" tIns="0" rIns="0" bIns="0" rtlCol="0"/>
-          <a:lstStyle/>
-          <a:p/>
-        </p:txBody>
-      </p:sp>
-      <p:sp>
-        <p:nvSpPr>
-          <p:cNvPr id="67" name="object 67"/>
-          <p:cNvSpPr/>
-          <p:nvPr/>
-        </p:nvSpPr>
-        <p:spPr>
-          <a:xfrm>
-            <a:off x="7760207" y="3610355"/>
-            <a:ext cx="1259205" cy="281940"/>
-          </a:xfrm>
-          <a:custGeom>
-            <a:avLst/>
-            <a:gdLst/>
-            <a:ahLst/>
-            <a:cxnLst/>
-            <a:rect l="l" t="t" r="r" b="b"/>
-            <a:pathLst>
-              <a:path w="1259204" h="281939">
-                <a:moveTo>
-                  <a:pt x="1258824" y="0"/>
-                </a:moveTo>
-                <a:lnTo>
-                  <a:pt x="0" y="0"/>
-                </a:lnTo>
-                <a:lnTo>
-                  <a:pt x="0" y="281940"/>
-                </a:lnTo>
-                <a:lnTo>
-                  <a:pt x="1258824" y="281940"/>
-                </a:lnTo>
-                <a:lnTo>
-                  <a:pt x="1258824" y="0"/>
-                </a:lnTo>
-                <a:close/>
-              </a:path>
-            </a:pathLst>
-          </a:custGeom>
-          <a:solidFill>
-            <a:srgbClr val="F8D1CD"/>
-          </a:solidFill>
-        </p:spPr>
-        <p:txBody>
-          <a:bodyPr wrap="square" lIns="0" tIns="0" rIns="0" bIns="0" rtlCol="0"/>
-          <a:lstStyle/>
-          <a:p/>
-        </p:txBody>
-      </p:sp>
-      <p:sp>
-        <p:nvSpPr>
-          <p:cNvPr id="68" name="object 68"/>
-          <p:cNvSpPr/>
-          <p:nvPr/>
-        </p:nvSpPr>
-        <p:spPr>
-          <a:xfrm>
-            <a:off x="9459468" y="3610355"/>
-            <a:ext cx="1259205" cy="281940"/>
-          </a:xfrm>
-          <a:custGeom>
-            <a:avLst/>
-            <a:gdLst/>
-            <a:ahLst/>
-            <a:cxnLst/>
-            <a:rect l="l" t="t" r="r" b="b"/>
-            <a:pathLst>
-              <a:path w="1259204" h="281939">
-                <a:moveTo>
-                  <a:pt x="1258824" y="0"/>
-                </a:moveTo>
-                <a:lnTo>
-                  <a:pt x="0" y="0"/>
-                </a:lnTo>
-                <a:lnTo>
-                  <a:pt x="0" y="281940"/>
-                </a:lnTo>
-                <a:lnTo>
-                  <a:pt x="1258824" y="281940"/>
-                </a:lnTo>
-                <a:lnTo>
-                  <a:pt x="1258824" y="0"/>
-                </a:lnTo>
-                <a:close/>
-              </a:path>
-            </a:pathLst>
-          </a:custGeom>
-          <a:solidFill>
-            <a:srgbClr val="F8D1CD"/>
-          </a:solidFill>
-        </p:spPr>
-        <p:txBody>
-          <a:bodyPr wrap="square" lIns="0" tIns="0" rIns="0" bIns="0" rtlCol="0"/>
-          <a:lstStyle/>
-          <a:p/>
-        </p:txBody>
-      </p:sp>
-      <p:sp>
-        <p:nvSpPr>
-          <p:cNvPr id="69" name="object 69"/>
-          <p:cNvSpPr/>
-          <p:nvPr/>
-        </p:nvSpPr>
-        <p:spPr>
-          <a:xfrm>
-            <a:off x="4485132" y="3998976"/>
-            <a:ext cx="1259205" cy="281940"/>
-          </a:xfrm>
-          <a:custGeom>
-            <a:avLst/>
-            <a:gdLst/>
-            <a:ahLst/>
-            <a:cxnLst/>
-            <a:rect l="l" t="t" r="r" b="b"/>
-            <a:pathLst>
-              <a:path w="1259204" h="281939">
-                <a:moveTo>
-                  <a:pt x="1258824" y="0"/>
-                </a:moveTo>
-                <a:lnTo>
-                  <a:pt x="0" y="0"/>
-                </a:lnTo>
-                <a:lnTo>
-                  <a:pt x="0" y="281940"/>
-                </a:lnTo>
-                <a:lnTo>
-                  <a:pt x="1258824" y="281940"/>
-                </a:lnTo>
-                <a:lnTo>
-                  <a:pt x="1258824" y="0"/>
-                </a:lnTo>
-                <a:close/>
-              </a:path>
-            </a:pathLst>
-          </a:custGeom>
-          <a:solidFill>
-            <a:srgbClr val="FBEAE8"/>
-          </a:solidFill>
-        </p:spPr>
-        <p:txBody>
-          <a:bodyPr wrap="square" lIns="0" tIns="0" rIns="0" bIns="0" rtlCol="0"/>
-          <a:lstStyle/>
-          <a:p/>
-        </p:txBody>
-      </p:sp>
-      <p:sp>
-        <p:nvSpPr>
-          <p:cNvPr id="70" name="object 70"/>
-          <p:cNvSpPr/>
-          <p:nvPr/>
-        </p:nvSpPr>
-        <p:spPr>
-          <a:xfrm>
-            <a:off x="6182867" y="3994403"/>
-            <a:ext cx="1259205" cy="281940"/>
-          </a:xfrm>
-          <a:custGeom>
-            <a:avLst/>
-            <a:gdLst/>
-            <a:ahLst/>
-            <a:cxnLst/>
-            <a:rect l="l" t="t" r="r" b="b"/>
-            <a:pathLst>
-              <a:path w="1259204" h="281939">
-                <a:moveTo>
-                  <a:pt x="1258824" y="0"/>
-                </a:moveTo>
-                <a:lnTo>
-                  <a:pt x="0" y="0"/>
-                </a:lnTo>
-                <a:lnTo>
-                  <a:pt x="0" y="281940"/>
-                </a:lnTo>
-                <a:lnTo>
-                  <a:pt x="1258824" y="281940"/>
-                </a:lnTo>
-                <a:lnTo>
-                  <a:pt x="1258824" y="0"/>
-                </a:lnTo>
-                <a:close/>
-              </a:path>
-            </a:pathLst>
-          </a:custGeom>
-          <a:solidFill>
-            <a:srgbClr val="FBEAE8"/>
-          </a:solidFill>
-        </p:spPr>
-        <p:txBody>
-          <a:bodyPr wrap="square" lIns="0" tIns="0" rIns="0" bIns="0" rtlCol="0"/>
-          <a:lstStyle/>
-          <a:p/>
-        </p:txBody>
-      </p:sp>
-      <p:sp>
-        <p:nvSpPr>
-          <p:cNvPr id="71" name="object 71"/>
-          <p:cNvSpPr/>
-          <p:nvPr/>
-        </p:nvSpPr>
-        <p:spPr>
-          <a:xfrm>
-            <a:off x="7760207" y="3998976"/>
-            <a:ext cx="1259205" cy="281940"/>
-          </a:xfrm>
-          <a:custGeom>
-            <a:avLst/>
-            <a:gdLst/>
-            <a:ahLst/>
-            <a:cxnLst/>
-            <a:rect l="l" t="t" r="r" b="b"/>
-            <a:pathLst>
-              <a:path w="1259204" h="281939">
-                <a:moveTo>
-                  <a:pt x="1258824" y="0"/>
-                </a:moveTo>
-                <a:lnTo>
-                  <a:pt x="0" y="0"/>
-                </a:lnTo>
-                <a:lnTo>
-                  <a:pt x="0" y="281940"/>
-                </a:lnTo>
-                <a:lnTo>
-                  <a:pt x="1258824" y="281940"/>
-                </a:lnTo>
-                <a:lnTo>
-                  <a:pt x="1258824" y="0"/>
-                </a:lnTo>
-                <a:close/>
-              </a:path>
-            </a:pathLst>
-          </a:custGeom>
-          <a:solidFill>
-            <a:srgbClr val="FBEAE8"/>
-          </a:solidFill>
-        </p:spPr>
-        <p:txBody>
-          <a:bodyPr wrap="square" lIns="0" tIns="0" rIns="0" bIns="0" rtlCol="0"/>
-          <a:lstStyle/>
-          <a:p/>
-        </p:txBody>
-      </p:sp>
-      <p:sp>
-        <p:nvSpPr>
-          <p:cNvPr id="72" name="object 72"/>
-          <p:cNvSpPr/>
-          <p:nvPr/>
-        </p:nvSpPr>
-        <p:spPr>
-          <a:xfrm>
-            <a:off x="9459468" y="3994403"/>
-            <a:ext cx="1259205" cy="281940"/>
-          </a:xfrm>
-          <a:custGeom>
-            <a:avLst/>
-            <a:gdLst/>
-            <a:ahLst/>
-            <a:cxnLst/>
-            <a:rect l="l" t="t" r="r" b="b"/>
-            <a:pathLst>
-              <a:path w="1259204" h="281939">
-                <a:moveTo>
-                  <a:pt x="1258824" y="0"/>
-                </a:moveTo>
-                <a:lnTo>
-                  <a:pt x="0" y="0"/>
-                </a:lnTo>
-                <a:lnTo>
-                  <a:pt x="0" y="281940"/>
-                </a:lnTo>
-                <a:lnTo>
-                  <a:pt x="1258824" y="281940"/>
-                </a:lnTo>
-                <a:lnTo>
-                  <a:pt x="1258824" y="0"/>
-                </a:lnTo>
-                <a:close/>
-              </a:path>
-            </a:pathLst>
-          </a:custGeom>
-          <a:solidFill>
-            <a:srgbClr val="FBEAE8"/>
-          </a:solidFill>
-        </p:spPr>
-        <p:txBody>
-          <a:bodyPr wrap="square" lIns="0" tIns="0" rIns="0" bIns="0" rtlCol="0"/>
-          <a:lstStyle/>
-          <a:p/>
-        </p:txBody>
-      </p:sp>
-      <p:sp>
-        <p:nvSpPr>
-          <p:cNvPr id="73" name="object 73"/>
-          <p:cNvSpPr/>
-          <p:nvPr/>
-        </p:nvSpPr>
-        <p:spPr>
-          <a:xfrm>
-            <a:off x="4485132" y="4419600"/>
-            <a:ext cx="1379220" cy="281940"/>
-          </a:xfrm>
-          <a:custGeom>
-            <a:avLst/>
-            <a:gdLst/>
-            <a:ahLst/>
-            <a:cxnLst/>
-            <a:rect l="l" t="t" r="r" b="b"/>
-            <a:pathLst>
-              <a:path w="1379220" h="281939">
-                <a:moveTo>
-                  <a:pt x="1379219" y="0"/>
-                </a:moveTo>
-                <a:lnTo>
-                  <a:pt x="0" y="0"/>
-                </a:lnTo>
-                <a:lnTo>
-                  <a:pt x="0" y="281939"/>
-                </a:lnTo>
-                <a:lnTo>
-                  <a:pt x="1379219" y="281939"/>
-                </a:lnTo>
-                <a:lnTo>
-                  <a:pt x="1379219" y="0"/>
-                </a:lnTo>
-                <a:close/>
-              </a:path>
-            </a:pathLst>
-          </a:custGeom>
-          <a:solidFill>
-            <a:srgbClr val="F8D1CD"/>
-          </a:solidFill>
-        </p:spPr>
-        <p:txBody>
-          <a:bodyPr wrap="square" lIns="0" tIns="0" rIns="0" bIns="0" rtlCol="0"/>
-          <a:lstStyle/>
-          <a:p/>
-        </p:txBody>
-      </p:sp>
-      <p:sp>
-        <p:nvSpPr>
-          <p:cNvPr id="74" name="object 74"/>
-          <p:cNvSpPr/>
-          <p:nvPr/>
-        </p:nvSpPr>
-        <p:spPr>
-          <a:xfrm>
-            <a:off x="6182867" y="4419600"/>
-            <a:ext cx="1259205" cy="281940"/>
-          </a:xfrm>
-          <a:custGeom>
-            <a:avLst/>
-            <a:gdLst/>
-            <a:ahLst/>
-            <a:cxnLst/>
-            <a:rect l="l" t="t" r="r" b="b"/>
-            <a:pathLst>
-              <a:path w="1259204" h="281939">
-                <a:moveTo>
-                  <a:pt x="1258824" y="0"/>
-                </a:moveTo>
-                <a:lnTo>
-                  <a:pt x="0" y="0"/>
-                </a:lnTo>
-                <a:lnTo>
-                  <a:pt x="0" y="281939"/>
-                </a:lnTo>
-                <a:lnTo>
-                  <a:pt x="1258824" y="281939"/>
-                </a:lnTo>
-                <a:lnTo>
-                  <a:pt x="1258824" y="0"/>
-                </a:lnTo>
-                <a:close/>
-              </a:path>
-            </a:pathLst>
-          </a:custGeom>
-          <a:solidFill>
-            <a:srgbClr val="F8D1CD"/>
-          </a:solidFill>
-        </p:spPr>
-        <p:txBody>
-          <a:bodyPr wrap="square" lIns="0" tIns="0" rIns="0" bIns="0" rtlCol="0"/>
-          <a:lstStyle/>
-          <a:p/>
-        </p:txBody>
-      </p:sp>
-      <p:sp>
-        <p:nvSpPr>
-          <p:cNvPr id="75" name="object 75"/>
-          <p:cNvSpPr/>
-          <p:nvPr/>
-        </p:nvSpPr>
-        <p:spPr>
-          <a:xfrm>
-            <a:off x="7760207" y="4419600"/>
-            <a:ext cx="1259205" cy="281940"/>
-          </a:xfrm>
-          <a:custGeom>
-            <a:avLst/>
-            <a:gdLst/>
-            <a:ahLst/>
-            <a:cxnLst/>
-            <a:rect l="l" t="t" r="r" b="b"/>
-            <a:pathLst>
-              <a:path w="1259204" h="281939">
-                <a:moveTo>
-                  <a:pt x="1258824" y="0"/>
-                </a:moveTo>
-                <a:lnTo>
-                  <a:pt x="0" y="0"/>
-                </a:lnTo>
-                <a:lnTo>
-                  <a:pt x="0" y="281939"/>
-                </a:lnTo>
-                <a:lnTo>
-                  <a:pt x="1258824" y="281939"/>
-                </a:lnTo>
-                <a:lnTo>
-                  <a:pt x="1258824" y="0"/>
-                </a:lnTo>
-                <a:close/>
-              </a:path>
-            </a:pathLst>
-          </a:custGeom>
-          <a:solidFill>
-            <a:srgbClr val="F8D1CD"/>
-          </a:solidFill>
-        </p:spPr>
-        <p:txBody>
-          <a:bodyPr wrap="square" lIns="0" tIns="0" rIns="0" bIns="0" rtlCol="0"/>
-          <a:lstStyle/>
-          <a:p/>
-        </p:txBody>
-      </p:sp>
-      <p:sp>
-        <p:nvSpPr>
-          <p:cNvPr id="76" name="object 76"/>
-          <p:cNvSpPr/>
-          <p:nvPr/>
-        </p:nvSpPr>
-        <p:spPr>
-          <a:xfrm>
-            <a:off x="9459468" y="4419600"/>
-            <a:ext cx="1259205" cy="281940"/>
-          </a:xfrm>
-          <a:custGeom>
-            <a:avLst/>
-            <a:gdLst/>
-            <a:ahLst/>
-            <a:cxnLst/>
-            <a:rect l="l" t="t" r="r" b="b"/>
-            <a:pathLst>
-              <a:path w="1259204" h="281939">
-                <a:moveTo>
-                  <a:pt x="1258824" y="0"/>
-                </a:moveTo>
-                <a:lnTo>
-                  <a:pt x="0" y="0"/>
-                </a:lnTo>
-                <a:lnTo>
-                  <a:pt x="0" y="281939"/>
-                </a:lnTo>
-                <a:lnTo>
-                  <a:pt x="1258824" y="281939"/>
-                </a:lnTo>
-                <a:lnTo>
-                  <a:pt x="1258824" y="0"/>
-                </a:lnTo>
-                <a:close/>
-              </a:path>
-            </a:pathLst>
-          </a:custGeom>
-          <a:solidFill>
-            <a:srgbClr val="F8D1CD"/>
-          </a:solidFill>
-        </p:spPr>
-        <p:txBody>
-          <a:bodyPr wrap="square" lIns="0" tIns="0" rIns="0" bIns="0" rtlCol="0"/>
-          <a:lstStyle/>
-          <a:p/>
-        </p:txBody>
-      </p:sp>
-      <p:sp>
-        <p:nvSpPr>
           <p:cNvPr id="77" name="Slide Number Placeholder 76"/>
           <p:cNvSpPr>
             <a:spLocks noGrp="1"/>

</xml_diff>